<commit_message>
"Analyze TMDB's top-rated movies data using SQL."
</commit_message>
<xml_diff>
--- a/SQL Project.pptx
+++ b/SQL Project.pptx
@@ -17975,7 +17975,7 @@
       </p:sp>
       <mc:AlternateContent xmlns:mc="http://schemas.openxmlformats.org/markup-compatibility/2006">
         <mc:Choice xmlns:p14="http://schemas.microsoft.com/office/powerpoint/2010/main" Requires="p14">
-          <p:contentPart p14:bwMode="auto" r:id="rId5">
+          <p:contentPart p14:bwMode="auto" r:id="rId3">
             <p14:nvContentPartPr>
               <p14:cNvPr id="5" name="Ink 4">
                 <a:extLst>
@@ -18007,7 +18007,7 @@
               <p:nvPr/>
             </p:nvPicPr>
             <p:blipFill>
-              <a:blip r:embed="rId6"/>
+              <a:blip r:embed="rId4"/>
               <a:stretch>
                 <a:fillRect/>
               </a:stretch>
@@ -18024,129 +18024,6 @@
           </p:pic>
         </mc:Fallback>
       </mc:AlternateContent>
-      <p:pic>
-        <p:nvPicPr>
-          <p:cNvPr id="10" name="Audio 9">
-            <a:hlinkClick r:id="" action="ppaction://media"/>
-            <a:extLst>
-              <a:ext uri="{FF2B5EF4-FFF2-40B4-BE49-F238E27FC236}">
-                <a16:creationId xmlns:a16="http://schemas.microsoft.com/office/drawing/2014/main" id="{0F9CD9F7-27C5-B3E9-F0B9-BF75673BD4FF}"/>
-              </a:ext>
-            </a:extLst>
-          </p:cNvPr>
-          <p:cNvPicPr>
-            <a:picLocks noChangeAspect="1"/>
-          </p:cNvPicPr>
-          <p:nvPr>
-            <a:audioFile r:link="rId2"/>
-            <p:extLst>
-              <p:ext uri="{DAA4B4D4-6D71-4841-9C94-3DE7FCFB9230}">
-                <p14:media xmlns:p14="http://schemas.microsoft.com/office/powerpoint/2010/main" r:embed="rId1"/>
-              </p:ext>
-            </p:extLst>
-          </p:nvPr>
-        </p:nvPicPr>
-        <p:blipFill>
-          <a:blip r:embed="rId7"/>
-          <a:srcRect l="-161075" t="-161075" r="-161075" b="-161075"/>
-          <a:stretch>
-            <a:fillRect/>
-          </a:stretch>
-        </p:blipFill>
-        <p:spPr>
-          <a:xfrm>
-            <a:off x="10052304" y="4718304"/>
-            <a:ext cx="2057400" cy="2057400"/>
-          </a:xfrm>
-          <a:prstGeom prst="ellipse">
-            <a:avLst/>
-          </a:prstGeom>
-          <a:ln w="19050" cap="rnd">
-            <a:solidFill>
-              <a:srgbClr val="404040"/>
-            </a:solidFill>
-          </a:ln>
-          <a:effectLst/>
-        </p:spPr>
-      </p:pic>
-      <p:pic>
-        <p:nvPicPr>
-          <p:cNvPr id="11" name="Audio 10">
-            <a:hlinkClick r:id="" action="ppaction://media"/>
-            <a:extLst>
-              <a:ext uri="{FF2B5EF4-FFF2-40B4-BE49-F238E27FC236}">
-                <a16:creationId xmlns:a16="http://schemas.microsoft.com/office/drawing/2014/main" id="{E5D1E2AF-97A4-4629-87FE-8263975D3640}"/>
-              </a:ext>
-            </a:extLst>
-          </p:cNvPr>
-          <p:cNvPicPr>
-            <a:picLocks noChangeAspect="1"/>
-          </p:cNvPicPr>
-          <p:nvPr>
-            <a:audioFile r:link="rId2"/>
-            <p:extLst>
-              <p:ext uri="{DAA4B4D4-6D71-4841-9C94-3DE7FCFB9230}">
-                <p14:media xmlns:p14="http://schemas.microsoft.com/office/powerpoint/2010/main" r:embed="rId1"/>
-              </p:ext>
-            </p:extLst>
-          </p:nvPr>
-        </p:nvPicPr>
-        <p:blipFill>
-          <a:blip r:embed="rId7"/>
-          <a:srcRect l="-161075" t="-161075" r="-161075" b="-161075"/>
-          <a:stretch>
-            <a:fillRect/>
-          </a:stretch>
-        </p:blipFill>
-        <p:spPr>
-          <a:xfrm>
-            <a:off x="10052304" y="4718304"/>
-            <a:ext cx="2057400" cy="2057400"/>
-          </a:xfrm>
-          <a:prstGeom prst="ellipse">
-            <a:avLst/>
-          </a:prstGeom>
-        </p:spPr>
-      </p:pic>
-      <p:pic>
-        <p:nvPicPr>
-          <p:cNvPr id="12" name="Audio 11">
-            <a:hlinkClick r:id="" action="ppaction://media"/>
-            <a:extLst>
-              <a:ext uri="{FF2B5EF4-FFF2-40B4-BE49-F238E27FC236}">
-                <a16:creationId xmlns:a16="http://schemas.microsoft.com/office/drawing/2014/main" id="{805A7542-91A9-3129-6884-AEA242EB7CBB}"/>
-              </a:ext>
-            </a:extLst>
-          </p:cNvPr>
-          <p:cNvPicPr>
-            <a:picLocks noChangeAspect="1"/>
-          </p:cNvPicPr>
-          <p:nvPr>
-            <a:audioFile r:link="rId2"/>
-            <p:extLst>
-              <p:ext uri="{DAA4B4D4-6D71-4841-9C94-3DE7FCFB9230}">
-                <p14:media xmlns:p14="http://schemas.microsoft.com/office/powerpoint/2010/main" r:embed="rId1"/>
-              </p:ext>
-            </p:extLst>
-          </p:nvPr>
-        </p:nvPicPr>
-        <p:blipFill>
-          <a:blip r:embed="rId7"/>
-          <a:srcRect l="-161075" t="-161075" r="-161075" b="-161075"/>
-          <a:stretch>
-            <a:fillRect/>
-          </a:stretch>
-        </p:blipFill>
-        <p:spPr>
-          <a:xfrm>
-            <a:off x="10052304" y="4718304"/>
-            <a:ext cx="2057400" cy="2057400"/>
-          </a:xfrm>
-          <a:prstGeom prst="ellipse">
-            <a:avLst/>
-          </a:prstGeom>
-        </p:spPr>
-      </p:pic>
     </p:spTree>
     <p:extLst>
       <p:ext uri="{BB962C8B-B14F-4D97-AF65-F5344CB8AC3E}">
@@ -18165,183 +18042,6 @@
       <p:transition spd="slow" advTm="18053"/>
     </mc:Fallback>
   </mc:AlternateContent>
-  <p:timing>
-    <p:tnLst>
-      <p:par>
-        <p:cTn id="1" dur="indefinite" restart="never" nodeType="tmRoot">
-          <p:childTnLst>
-            <p:seq concurrent="1" nextAc="seek">
-              <p:cTn id="2" dur="indefinite" nodeType="mainSeq">
-                <p:childTnLst>
-                  <p:par>
-                    <p:cTn id="3" fill="hold">
-                      <p:stCondLst>
-                        <p:cond delay="indefinite"/>
-                        <p:cond evt="onBegin" delay="0">
-                          <p:tn val="2"/>
-                        </p:cond>
-                      </p:stCondLst>
-                      <p:childTnLst>
-                        <p:par>
-                          <p:cTn id="4" fill="hold">
-                            <p:stCondLst>
-                              <p:cond delay="0"/>
-                            </p:stCondLst>
-                            <p:childTnLst>
-                              <p:par>
-                                <p:cTn id="5" presetID="1" presetClass="mediacall" presetSubtype="0" fill="hold" nodeType="afterEffect">
-                                  <p:stCondLst>
-                                    <p:cond delay="0"/>
-                                  </p:stCondLst>
-                                  <p:childTnLst>
-                                    <p:cmd type="call" cmd="playFrom(0.0)">
-                                      <p:cBhvr>
-                                        <p:cTn id="6" dur="1" fill="hold"/>
-                                        <p:tgtEl>
-                                          <p:spTgt spid="12"/>
-                                        </p:tgtEl>
-                                      </p:cBhvr>
-                                    </p:cmd>
-                                  </p:childTnLst>
-                                </p:cTn>
-                              </p:par>
-                            </p:childTnLst>
-                          </p:cTn>
-                        </p:par>
-                        <p:par>
-                          <p:cTn id="7" fill="hold">
-                            <p:stCondLst>
-                              <p:cond delay="0"/>
-                            </p:stCondLst>
-                            <p:childTnLst>
-                              <p:par>
-                                <p:cTn id="8" presetID="1" presetClass="mediacall" presetSubtype="0" fill="hold" nodeType="afterEffect">
-                                  <p:stCondLst>
-                                    <p:cond delay="0"/>
-                                  </p:stCondLst>
-                                  <p:childTnLst>
-                                    <p:cmd type="call" cmd="playFrom(0.0)">
-                                      <p:cBhvr>
-                                        <p:cTn id="9" dur="1" fill="hold"/>
-                                        <p:tgtEl>
-                                          <p:spTgt spid="11"/>
-                                        </p:tgtEl>
-                                      </p:cBhvr>
-                                    </p:cmd>
-                                  </p:childTnLst>
-                                </p:cTn>
-                              </p:par>
-                            </p:childTnLst>
-                          </p:cTn>
-                        </p:par>
-                        <p:par>
-                          <p:cTn id="10" fill="hold">
-                            <p:stCondLst>
-                              <p:cond delay="0"/>
-                            </p:stCondLst>
-                            <p:childTnLst>
-                              <p:par>
-                                <p:cTn id="11" presetID="1" presetClass="mediacall" presetSubtype="0" fill="hold" nodeType="afterEffect">
-                                  <p:stCondLst>
-                                    <p:cond delay="0"/>
-                                  </p:stCondLst>
-                                  <p:childTnLst>
-                                    <p:cmd type="call" cmd="playFrom(0.0)">
-                                      <p:cBhvr>
-                                        <p:cTn id="12" dur="1" fill="hold"/>
-                                        <p:tgtEl>
-                                          <p:spTgt spid="10"/>
-                                        </p:tgtEl>
-                                      </p:cBhvr>
-                                    </p:cmd>
-                                  </p:childTnLst>
-                                </p:cTn>
-                              </p:par>
-                            </p:childTnLst>
-                          </p:cTn>
-                        </p:par>
-                      </p:childTnLst>
-                    </p:cTn>
-                  </p:par>
-                </p:childTnLst>
-              </p:cTn>
-              <p:prevCondLst>
-                <p:cond evt="onPrev" delay="0">
-                  <p:tgtEl>
-                    <p:sldTgt/>
-                  </p:tgtEl>
-                </p:cond>
-              </p:prevCondLst>
-              <p:nextCondLst>
-                <p:cond evt="onNext" delay="0">
-                  <p:tgtEl>
-                    <p:sldTgt/>
-                  </p:tgtEl>
-                </p:cond>
-              </p:nextCondLst>
-            </p:seq>
-            <p:audio isNarration="1">
-              <p:cMediaNode vol="80000" showWhenStopped="0">
-                <p:cTn id="13" fill="hold" display="0">
-                  <p:stCondLst>
-                    <p:cond delay="indefinite"/>
-                  </p:stCondLst>
-                  <p:endCondLst>
-                    <p:cond evt="onStopAudio" delay="0">
-                      <p:tgtEl>
-                        <p:sldTgt/>
-                      </p:tgtEl>
-                    </p:cond>
-                  </p:endCondLst>
-                </p:cTn>
-                <p:tgtEl>
-                  <p:spTgt spid="10"/>
-                </p:tgtEl>
-              </p:cMediaNode>
-            </p:audio>
-            <p:audio isNarration="1">
-              <p:cMediaNode vol="80000" showWhenStopped="0">
-                <p:cTn id="14" fill="hold" display="0">
-                  <p:stCondLst>
-                    <p:cond delay="indefinite"/>
-                  </p:stCondLst>
-                  <p:endCondLst>
-                    <p:cond evt="onStopAudio" delay="0">
-                      <p:tgtEl>
-                        <p:sldTgt/>
-                      </p:tgtEl>
-                    </p:cond>
-                  </p:endCondLst>
-                </p:cTn>
-                <p:tgtEl>
-                  <p:spTgt spid="11"/>
-                </p:tgtEl>
-              </p:cMediaNode>
-            </p:audio>
-            <p:audio isNarration="1">
-              <p:cMediaNode vol="80000" showWhenStopped="0">
-                <p:cTn id="15" fill="hold" display="0">
-                  <p:stCondLst>
-                    <p:cond delay="indefinite"/>
-                  </p:stCondLst>
-                  <p:endCondLst>
-                    <p:cond evt="onStopAudio" delay="0">
-                      <p:tgtEl>
-                        <p:sldTgt/>
-                      </p:tgtEl>
-                    </p:cond>
-                  </p:endCondLst>
-                </p:cTn>
-                <p:tgtEl>
-                  <p:spTgt spid="12"/>
-                </p:tgtEl>
-              </p:cMediaNode>
-            </p:audio>
-          </p:childTnLst>
-        </p:cTn>
-      </p:par>
-    </p:tnLst>
-  </p:timing>
 </p:sld>
 </file>
 
@@ -19744,47 +19444,6 @@
           </a:p>
         </p:txBody>
       </p:sp>
-      <p:pic>
-        <p:nvPicPr>
-          <p:cNvPr id="8" name="Camera 7">
-            <a:extLst>
-              <a:ext uri="{FF2B5EF4-FFF2-40B4-BE49-F238E27FC236}">
-                <a16:creationId xmlns:a16="http://schemas.microsoft.com/office/drawing/2014/main" id="{B68F2219-9D53-F1BC-F1C8-BA588DD998FC}"/>
-              </a:ext>
-            </a:extLst>
-          </p:cNvPr>
-          <p:cNvPicPr>
-            <a:picLocks noChangeAspect="1"/>
-            <a:extLst>
-              <a:ext uri="{51228E76-BA90-4043-B771-695A4F85340A}">
-                <alf:liveFeedProps xmlns:alf="http://schemas.microsoft.com/office/drawing/2021/livefeed"/>
-              </a:ext>
-            </a:extLst>
-          </p:cNvPicPr>
-          <p:nvPr/>
-        </p:nvPicPr>
-        <p:blipFill>
-          <a:blip r:embed="rId3">
-            <a:extLst>
-              <a:ext uri="{96DAC541-7B7A-43D3-8B79-37D633B846F1}">
-                <asvg:svgBlip xmlns:asvg="http://schemas.microsoft.com/office/drawing/2016/SVG/main" r:embed="rId4"/>
-              </a:ext>
-            </a:extLst>
-          </a:blip>
-          <a:stretch>
-            <a:fillRect/>
-          </a:stretch>
-        </p:blipFill>
-        <p:spPr>
-          <a:xfrm>
-            <a:off x="10052304" y="4718304"/>
-            <a:ext cx="2057400" cy="2057400"/>
-          </a:xfrm>
-          <a:prstGeom prst="ellipse">
-            <a:avLst/>
-          </a:prstGeom>
-        </p:spPr>
-      </p:pic>
     </p:spTree>
     <p:extLst>
       <p:ext uri="{BB962C8B-B14F-4D97-AF65-F5344CB8AC3E}">

</xml_diff>